<commit_message>
Added github and trello board
Added GitHub and Trello board links to PowerPoint
</commit_message>
<xml_diff>
--- a/Tymara Manu Fepale - 000_91896 _ 91897 Documentation - 2444936.pptx
+++ b/Tymara Manu Fepale - 000_91896 _ 91897 Documentation - 2444936.pptx
@@ -8177,14 +8177,23 @@
               <a:buNone/>
             </a:pPr>
             <a:r>
-              <a:rPr lang="en" sz="2000" b="1">
+              <a:rPr lang="en" sz="2000" b="1" dirty="0">
                 <a:solidFill>
                   <a:srgbClr val="274E13"/>
                 </a:solidFill>
               </a:rPr>
               <a:t>Link to github Repository: </a:t>
             </a:r>
-            <a:endParaRPr sz="2000" b="1">
+            <a:r>
+              <a:rPr lang="en-US" sz="2000" b="1" dirty="0" err="1">
+                <a:solidFill>
+                  <a:srgbClr val="274E13"/>
+                </a:solidFill>
+                <a:hlinkClick r:id="rId3"/>
+              </a:rPr>
+              <a:t>Github</a:t>
+            </a:r>
+            <a:endParaRPr sz="2000" b="1" dirty="0">
               <a:solidFill>
                 <a:srgbClr val="274E13"/>
               </a:solidFill>
@@ -8208,7 +8217,7 @@
               <a:buFont typeface="Arial"/>
               <a:buNone/>
             </a:pPr>
-            <a:endParaRPr sz="2000">
+            <a:endParaRPr sz="2000" dirty="0">
               <a:solidFill>
                 <a:srgbClr val="274E13"/>
               </a:solidFill>
@@ -8233,14 +8242,23 @@
               <a:buNone/>
             </a:pPr>
             <a:r>
-              <a:rPr lang="en" sz="2000" b="1">
+              <a:rPr lang="en" sz="2000" b="1" dirty="0">
                 <a:solidFill>
                   <a:srgbClr val="274E13"/>
                 </a:solidFill>
               </a:rPr>
-              <a:t>Links to trello board / project management tools:</a:t>
+              <a:t>Links to trello board / project management tools: </a:t>
             </a:r>
-            <a:endParaRPr sz="2000"/>
+            <a:r>
+              <a:rPr lang="en-US" sz="2000" b="1" dirty="0">
+                <a:solidFill>
+                  <a:srgbClr val="274E13"/>
+                </a:solidFill>
+                <a:hlinkClick r:id="rId4"/>
+              </a:rPr>
+              <a:t>Trello Board</a:t>
+            </a:r>
+            <a:endParaRPr sz="2000" dirty="0"/>
           </a:p>
         </p:txBody>
       </p:sp>
@@ -9014,20 +9032,16 @@
             </a:pPr>
             <a:r>
               <a:rPr lang="en" dirty="0"/>
-              <a:t>Component 1 (Trello </a:t>
-            </a:r>
-            <a:r>
-              <a:rPr lang="en"/>
-              <a:t>screenshot)</a:t>
+              <a:t>Component 1 (Trello screenshot)</a:t>
             </a:r>
             <a:br>
-              <a:rPr lang="en"/>
+              <a:rPr lang="en" dirty="0"/>
             </a:br>
             <a:br>
-              <a:rPr lang="en"/>
+              <a:rPr lang="en" dirty="0"/>
             </a:br>
             <a:r>
-              <a:rPr lang="en"/>
+              <a:rPr lang="en" dirty="0"/>
               <a:t>Version 1                           Version 2</a:t>
             </a:r>
             <a:endParaRPr dirty="0"/>

</xml_diff>